<commit_message>
fix: diagram w/ key/val cache and acknowledgement
</commit_message>
<xml_diff>
--- a/docs/nginx-aws-signature.pptx
+++ b/docs/nginx-aws-signature.pptx
@@ -104,6 +104,11 @@
       </a:defRPr>
     </a:lvl9pPr>
   </p:defaultTextStyle>
+  <p:extLst>
+    <p:ext uri="{EFAFB233-063F-42B5-8137-9DF3F51BA10A}">
+      <p15:sldGuideLst xmlns:p15="http://schemas.microsoft.com/office/powerpoint/2012/main"/>
+    </p:ext>
+  </p:extLst>
 </p:presentation>
 </file>
 
@@ -5534,8 +5539,8 @@
         </p:nvGrpSpPr>
         <p:grpSpPr>
           <a:xfrm>
-            <a:off x="5076825" y="2930282"/>
-            <a:ext cx="4514849" cy="796218"/>
+            <a:off x="5076826" y="2930282"/>
+            <a:ext cx="3771084" cy="796218"/>
             <a:chOff x="5051957" y="2928621"/>
             <a:chExt cx="4560356" cy="845504"/>
           </a:xfrm>
@@ -5934,7 +5939,7 @@
         <p:spPr>
           <a:xfrm rot="5400000" flipH="1" flipV="1">
             <a:off x="3687479" y="3632125"/>
-            <a:ext cx="1474580" cy="1304112"/>
+            <a:ext cx="1474580" cy="1304113"/>
           </a:xfrm>
           <a:prstGeom prst="bentConnector2">
             <a:avLst/>
@@ -6070,646 +6075,6 @@
           </a:extLst>
         </p:spPr>
       </p:pic>
-      <p:sp>
-        <p:nvSpPr>
-          <p:cNvPr id="1057" name="직사각형 363">
-            <a:extLst>
-              <a:ext uri="{FF2B5EF4-FFF2-40B4-BE49-F238E27FC236}">
-                <a16:creationId xmlns:a16="http://schemas.microsoft.com/office/drawing/2014/main" id="{DE64B573-442D-DE23-C716-0B0871557E04}"/>
-              </a:ext>
-            </a:extLst>
-          </p:cNvPr>
-          <p:cNvSpPr/>
-          <p:nvPr/>
-        </p:nvSpPr>
-        <p:spPr>
-          <a:xfrm rot="16200000">
-            <a:off x="909622" y="6405178"/>
-            <a:ext cx="556863" cy="716510"/>
-          </a:xfrm>
-          <a:prstGeom prst="rect">
-            <a:avLst/>
-          </a:prstGeom>
-          <a:noFill/>
-          <a:ln w="3175" cap="flat" cmpd="sng" algn="ctr">
-            <a:solidFill>
-              <a:schemeClr val="bg1">
-                <a:lumMod val="65000"/>
-              </a:schemeClr>
-            </a:solidFill>
-            <a:prstDash val="dash"/>
-            <a:miter lim="800000"/>
-          </a:ln>
-          <a:effectLst/>
-        </p:spPr>
-        <p:txBody>
-          <a:bodyPr vert="vert" lIns="0" tIns="0" rIns="0" bIns="0" rtlCol="0" anchor="ctr" anchorCtr="0"/>
-          <a:lstStyle/>
-          <a:p>
-            <a:pPr algn="ctr">
-              <a:lnSpc>
-                <a:spcPct val="80000"/>
-              </a:lnSpc>
-            </a:pPr>
-            <a:r>
-              <a:rPr lang="en-US" altLang="ko-KR" sz="1200" kern="0" dirty="0">
-                <a:solidFill>
-                  <a:schemeClr val="bg1">
-                    <a:lumMod val="65000"/>
-                  </a:schemeClr>
-                </a:solidFill>
-                <a:latin typeface="Calibri" panose="020F0502020204030204" pitchFamily="34" charset="0"/>
-                <a:ea typeface="맑은 고딕"/>
-              </a:rPr>
-              <a:t>Laptop</a:t>
-            </a:r>
-          </a:p>
-          <a:p>
-            <a:pPr algn="ctr">
-              <a:lnSpc>
-                <a:spcPct val="80000"/>
-              </a:lnSpc>
-            </a:pPr>
-            <a:endParaRPr lang="ko-KR" altLang="en-US" sz="1200" kern="0" dirty="0">
-              <a:solidFill>
-                <a:schemeClr val="bg1">
-                  <a:lumMod val="65000"/>
-                </a:schemeClr>
-              </a:solidFill>
-              <a:latin typeface="Calibri" panose="020F0502020204030204" pitchFamily="34" charset="0"/>
-              <a:ea typeface="맑은 고딕"/>
-            </a:endParaRPr>
-          </a:p>
-        </p:txBody>
-      </p:sp>
-      <p:sp>
-        <p:nvSpPr>
-          <p:cNvPr id="1058" name="직사각형 363">
-            <a:extLst>
-              <a:ext uri="{FF2B5EF4-FFF2-40B4-BE49-F238E27FC236}">
-                <a16:creationId xmlns:a16="http://schemas.microsoft.com/office/drawing/2014/main" id="{5AFE1938-A02A-714D-A53D-172E5BF91FF6}"/>
-              </a:ext>
-            </a:extLst>
-          </p:cNvPr>
-          <p:cNvSpPr/>
-          <p:nvPr/>
-        </p:nvSpPr>
-        <p:spPr>
-          <a:xfrm rot="16200000">
-            <a:off x="2118346" y="5997818"/>
-            <a:ext cx="556863" cy="1531226"/>
-          </a:xfrm>
-          <a:prstGeom prst="rect">
-            <a:avLst/>
-          </a:prstGeom>
-          <a:noFill/>
-          <a:ln w="3175" cap="flat" cmpd="sng" algn="ctr">
-            <a:solidFill>
-              <a:schemeClr val="bg1">
-                <a:lumMod val="65000"/>
-              </a:schemeClr>
-            </a:solidFill>
-            <a:prstDash val="dash"/>
-            <a:miter lim="800000"/>
-          </a:ln>
-          <a:effectLst/>
-        </p:spPr>
-        <p:txBody>
-          <a:bodyPr vert="vert" lIns="0" tIns="0" rIns="0" bIns="0" rtlCol="0" anchor="ctr" anchorCtr="0"/>
-          <a:lstStyle/>
-          <a:p>
-            <a:pPr algn="ctr">
-              <a:lnSpc>
-                <a:spcPct val="80000"/>
-              </a:lnSpc>
-            </a:pPr>
-            <a:r>
-              <a:rPr lang="en-US" altLang="ko-KR" sz="1200" kern="0" dirty="0">
-                <a:solidFill>
-                  <a:schemeClr val="bg1">
-                    <a:lumMod val="65000"/>
-                  </a:schemeClr>
-                </a:solidFill>
-                <a:latin typeface="Calibri" panose="020F0502020204030204" pitchFamily="34" charset="0"/>
-                <a:ea typeface="맑은 고딕"/>
-              </a:rPr>
-              <a:t>Public Cloud</a:t>
-            </a:r>
-          </a:p>
-          <a:p>
-            <a:pPr algn="ctr">
-              <a:lnSpc>
-                <a:spcPct val="80000"/>
-              </a:lnSpc>
-            </a:pPr>
-            <a:endParaRPr lang="en-US" altLang="ko-KR" sz="1200" kern="0" dirty="0">
-              <a:solidFill>
-                <a:schemeClr val="bg1">
-                  <a:lumMod val="65000"/>
-                </a:schemeClr>
-              </a:solidFill>
-              <a:latin typeface="Calibri" panose="020F0502020204030204" pitchFamily="34" charset="0"/>
-              <a:ea typeface="맑은 고딕"/>
-            </a:endParaRPr>
-          </a:p>
-        </p:txBody>
-      </p:sp>
-      <p:sp>
-        <p:nvSpPr>
-          <p:cNvPr id="1059" name="직사각형 363">
-            <a:extLst>
-              <a:ext uri="{FF2B5EF4-FFF2-40B4-BE49-F238E27FC236}">
-                <a16:creationId xmlns:a16="http://schemas.microsoft.com/office/drawing/2014/main" id="{6461A0E8-AAB4-9505-1708-C17819027981}"/>
-              </a:ext>
-            </a:extLst>
-          </p:cNvPr>
-          <p:cNvSpPr/>
-          <p:nvPr/>
-        </p:nvSpPr>
-        <p:spPr>
-          <a:xfrm rot="16200000">
-            <a:off x="3692444" y="6030622"/>
-            <a:ext cx="556863" cy="1476283"/>
-          </a:xfrm>
-          <a:prstGeom prst="rect">
-            <a:avLst/>
-          </a:prstGeom>
-          <a:noFill/>
-          <a:ln w="3175" cap="flat" cmpd="sng" algn="ctr">
-            <a:solidFill>
-              <a:schemeClr val="bg1">
-                <a:lumMod val="65000"/>
-              </a:schemeClr>
-            </a:solidFill>
-            <a:prstDash val="dash"/>
-            <a:miter lim="800000"/>
-          </a:ln>
-          <a:effectLst/>
-        </p:spPr>
-        <p:txBody>
-          <a:bodyPr vert="vert" lIns="0" tIns="0" rIns="0" bIns="0" rtlCol="0" anchor="ctr" anchorCtr="0"/>
-          <a:lstStyle/>
-          <a:p>
-            <a:pPr algn="ctr">
-              <a:lnSpc>
-                <a:spcPct val="80000"/>
-              </a:lnSpc>
-            </a:pPr>
-            <a:r>
-              <a:rPr lang="en-US" altLang="ko-KR" sz="1200" kern="0" dirty="0">
-                <a:solidFill>
-                  <a:schemeClr val="bg1">
-                    <a:lumMod val="65000"/>
-                  </a:schemeClr>
-                </a:solidFill>
-                <a:latin typeface="Calibri" panose="020F0502020204030204" pitchFamily="34" charset="0"/>
-                <a:ea typeface="맑은 고딕"/>
-              </a:rPr>
-              <a:t>Private Cloud</a:t>
-            </a:r>
-          </a:p>
-          <a:p>
-            <a:pPr algn="ctr">
-              <a:lnSpc>
-                <a:spcPct val="80000"/>
-              </a:lnSpc>
-            </a:pPr>
-            <a:endParaRPr lang="ko-KR" altLang="en-US" sz="1200" kern="0" dirty="0">
-              <a:solidFill>
-                <a:schemeClr val="bg1">
-                  <a:lumMod val="65000"/>
-                </a:schemeClr>
-              </a:solidFill>
-              <a:latin typeface="Calibri" panose="020F0502020204030204" pitchFamily="34" charset="0"/>
-              <a:ea typeface="맑은 고딕"/>
-            </a:endParaRPr>
-          </a:p>
-        </p:txBody>
-      </p:sp>
-      <p:sp>
-        <p:nvSpPr>
-          <p:cNvPr id="1060" name="직사각형 363">
-            <a:extLst>
-              <a:ext uri="{FF2B5EF4-FFF2-40B4-BE49-F238E27FC236}">
-                <a16:creationId xmlns:a16="http://schemas.microsoft.com/office/drawing/2014/main" id="{D6368F62-2CDC-DE7C-3F12-FCCEAA08DDBF}"/>
-              </a:ext>
-            </a:extLst>
-          </p:cNvPr>
-          <p:cNvSpPr/>
-          <p:nvPr/>
-        </p:nvSpPr>
-        <p:spPr>
-          <a:xfrm rot="16200000">
-            <a:off x="4944528" y="6330552"/>
-            <a:ext cx="556863" cy="876280"/>
-          </a:xfrm>
-          <a:prstGeom prst="rect">
-            <a:avLst/>
-          </a:prstGeom>
-          <a:noFill/>
-          <a:ln w="3175" cap="flat" cmpd="sng" algn="ctr">
-            <a:solidFill>
-              <a:schemeClr val="bg1">
-                <a:lumMod val="65000"/>
-              </a:schemeClr>
-            </a:solidFill>
-            <a:prstDash val="dash"/>
-            <a:miter lim="800000"/>
-          </a:ln>
-          <a:effectLst/>
-        </p:spPr>
-        <p:txBody>
-          <a:bodyPr vert="vert" lIns="0" tIns="0" rIns="0" bIns="0" rtlCol="0" anchor="ctr" anchorCtr="0"/>
-          <a:lstStyle/>
-          <a:p>
-            <a:pPr algn="ctr">
-              <a:lnSpc>
-                <a:spcPct val="80000"/>
-              </a:lnSpc>
-            </a:pPr>
-            <a:r>
-              <a:rPr lang="en-US" altLang="ko-KR" sz="1200" kern="0" dirty="0">
-                <a:solidFill>
-                  <a:schemeClr val="bg1">
-                    <a:lumMod val="65000"/>
-                  </a:schemeClr>
-                </a:solidFill>
-                <a:latin typeface="Calibri" panose="020F0502020204030204" pitchFamily="34" charset="0"/>
-                <a:ea typeface="맑은 고딕"/>
-              </a:rPr>
-              <a:t>On-Premise</a:t>
-            </a:r>
-          </a:p>
-          <a:p>
-            <a:pPr algn="ctr">
-              <a:lnSpc>
-                <a:spcPct val="80000"/>
-              </a:lnSpc>
-            </a:pPr>
-            <a:endParaRPr lang="ko-KR" altLang="en-US" sz="1200" kern="0" dirty="0">
-              <a:solidFill>
-                <a:schemeClr val="bg1">
-                  <a:lumMod val="65000"/>
-                </a:schemeClr>
-              </a:solidFill>
-              <a:latin typeface="Calibri" panose="020F0502020204030204" pitchFamily="34" charset="0"/>
-              <a:ea typeface="맑은 고딕"/>
-            </a:endParaRPr>
-          </a:p>
-        </p:txBody>
-      </p:sp>
-      <p:sp>
-        <p:nvSpPr>
-          <p:cNvPr id="1061" name="직사각형 363">
-            <a:extLst>
-              <a:ext uri="{FF2B5EF4-FFF2-40B4-BE49-F238E27FC236}">
-                <a16:creationId xmlns:a16="http://schemas.microsoft.com/office/drawing/2014/main" id="{FA826FC5-058D-084A-B44C-79F8EFCDCAB9}"/>
-              </a:ext>
-            </a:extLst>
-          </p:cNvPr>
-          <p:cNvSpPr/>
-          <p:nvPr/>
-        </p:nvSpPr>
-        <p:spPr>
-          <a:xfrm>
-            <a:off x="860170" y="6807254"/>
-            <a:ext cx="656683" cy="206025"/>
-          </a:xfrm>
-          <a:prstGeom prst="rect">
-            <a:avLst/>
-          </a:prstGeom>
-          <a:solidFill>
-            <a:schemeClr val="bg1">
-              <a:lumMod val="95000"/>
-            </a:schemeClr>
-          </a:solidFill>
-          <a:ln w="3175" cap="flat" cmpd="sng" algn="ctr">
-            <a:noFill/>
-            <a:prstDash val="solid"/>
-            <a:miter lim="800000"/>
-          </a:ln>
-          <a:effectLst/>
-        </p:spPr>
-        <p:txBody>
-          <a:bodyPr lIns="0" tIns="0" rIns="0" bIns="0" rtlCol="0" anchor="ctr"/>
-          <a:lstStyle/>
-          <a:p>
-            <a:pPr marL="0" marR="0" lvl="0" indent="0" algn="ctr" defTabSz="914400" eaLnBrk="1" fontAlgn="auto" latinLnBrk="0" hangingPunct="1">
-              <a:spcBef>
-                <a:spcPts val="0"/>
-              </a:spcBef>
-              <a:spcAft>
-                <a:spcPts val="0"/>
-              </a:spcAft>
-              <a:buClrTx/>
-              <a:buSzTx/>
-              <a:buFontTx/>
-              <a:buNone/>
-              <a:tabLst/>
-              <a:defRPr/>
-            </a:pPr>
-            <a:r>
-              <a:rPr kumimoji="0" lang="en-US" altLang="ko-KR" sz="1000" i="0" u="none" strike="noStrike" kern="0" cap="none" spc="0" normalizeH="0" baseline="0" noProof="0" dirty="0">
-                <a:ln>
-                  <a:noFill/>
-                </a:ln>
-                <a:solidFill>
-                  <a:schemeClr val="tx1">
-                    <a:lumMod val="50000"/>
-                    <a:lumOff val="50000"/>
-                  </a:schemeClr>
-                </a:solidFill>
-                <a:effectLst/>
-                <a:uLnTx/>
-                <a:uFillTx/>
-                <a:latin typeface="Calibri" panose="020F0502020204030204" pitchFamily="34" charset="0"/>
-                <a:ea typeface="맑은 고딕"/>
-              </a:rPr>
-              <a:t>Env Vars</a:t>
-            </a:r>
-            <a:endParaRPr kumimoji="0" lang="ko-KR" altLang="en-US" sz="1000" i="0" u="none" strike="noStrike" kern="0" cap="none" spc="0" normalizeH="0" baseline="0" noProof="0" dirty="0">
-              <a:ln>
-                <a:noFill/>
-              </a:ln>
-              <a:solidFill>
-                <a:schemeClr val="tx1">
-                  <a:lumMod val="50000"/>
-                  <a:lumOff val="50000"/>
-                </a:schemeClr>
-              </a:solidFill>
-              <a:effectLst/>
-              <a:uLnTx/>
-              <a:uFillTx/>
-              <a:latin typeface="Calibri" panose="020F0502020204030204" pitchFamily="34" charset="0"/>
-              <a:ea typeface="맑은 고딕"/>
-            </a:endParaRPr>
-          </a:p>
-        </p:txBody>
-      </p:sp>
-      <p:sp>
-        <p:nvSpPr>
-          <p:cNvPr id="1062" name="직사각형 363">
-            <a:extLst>
-              <a:ext uri="{FF2B5EF4-FFF2-40B4-BE49-F238E27FC236}">
-                <a16:creationId xmlns:a16="http://schemas.microsoft.com/office/drawing/2014/main" id="{6E57E647-F0F4-9357-9BF6-582E38D6A698}"/>
-              </a:ext>
-            </a:extLst>
-          </p:cNvPr>
-          <p:cNvSpPr/>
-          <p:nvPr/>
-        </p:nvSpPr>
-        <p:spPr>
-          <a:xfrm>
-            <a:off x="1660269" y="6816779"/>
-            <a:ext cx="1456697" cy="204642"/>
-          </a:xfrm>
-          <a:prstGeom prst="rect">
-            <a:avLst/>
-          </a:prstGeom>
-          <a:solidFill>
-            <a:schemeClr val="bg1">
-              <a:lumMod val="95000"/>
-            </a:schemeClr>
-          </a:solidFill>
-          <a:ln w="3175" cap="flat" cmpd="sng" algn="ctr">
-            <a:noFill/>
-            <a:prstDash val="solid"/>
-            <a:miter lim="800000"/>
-          </a:ln>
-          <a:effectLst/>
-        </p:spPr>
-        <p:txBody>
-          <a:bodyPr lIns="0" tIns="0" rIns="0" bIns="0" rtlCol="0" anchor="ctr"/>
-          <a:lstStyle/>
-          <a:p>
-            <a:pPr marL="0" marR="0" lvl="0" indent="0" algn="ctr" defTabSz="914400" eaLnBrk="1" fontAlgn="auto" latinLnBrk="0" hangingPunct="1">
-              <a:spcBef>
-                <a:spcPts val="0"/>
-              </a:spcBef>
-              <a:spcAft>
-                <a:spcPts val="0"/>
-              </a:spcAft>
-              <a:buClrTx/>
-              <a:buSzTx/>
-              <a:buFontTx/>
-              <a:buNone/>
-              <a:tabLst/>
-              <a:defRPr/>
-            </a:pPr>
-            <a:r>
-              <a:rPr kumimoji="0" lang="en-US" altLang="ko-KR" sz="1000" i="0" u="none" strike="noStrike" kern="0" cap="none" spc="0" normalizeH="0" baseline="0" noProof="0" dirty="0">
-                <a:ln>
-                  <a:noFill/>
-                </a:ln>
-                <a:solidFill>
-                  <a:schemeClr val="tx1">
-                    <a:lumMod val="50000"/>
-                    <a:lumOff val="50000"/>
-                  </a:schemeClr>
-                </a:solidFill>
-                <a:effectLst/>
-                <a:uLnTx/>
-                <a:uFillTx/>
-                <a:latin typeface="Calibri" panose="020F0502020204030204" pitchFamily="34" charset="0"/>
-                <a:ea typeface="맑은 고딕"/>
-              </a:rPr>
-              <a:t>Env Vars except AWS</a:t>
-            </a:r>
-            <a:endParaRPr kumimoji="0" lang="ko-KR" altLang="en-US" sz="1000" i="0" u="none" strike="noStrike" kern="0" cap="none" spc="0" normalizeH="0" baseline="0" noProof="0" dirty="0">
-              <a:ln>
-                <a:noFill/>
-              </a:ln>
-              <a:solidFill>
-                <a:schemeClr val="tx1">
-                  <a:lumMod val="50000"/>
-                  <a:lumOff val="50000"/>
-                </a:schemeClr>
-              </a:solidFill>
-              <a:effectLst/>
-              <a:uLnTx/>
-              <a:uFillTx/>
-              <a:latin typeface="Calibri" panose="020F0502020204030204" pitchFamily="34" charset="0"/>
-              <a:ea typeface="맑은 고딕"/>
-            </a:endParaRPr>
-          </a:p>
-        </p:txBody>
-      </p:sp>
-      <p:sp>
-        <p:nvSpPr>
-          <p:cNvPr id="1063" name="직사각형 363">
-            <a:extLst>
-              <a:ext uri="{FF2B5EF4-FFF2-40B4-BE49-F238E27FC236}">
-                <a16:creationId xmlns:a16="http://schemas.microsoft.com/office/drawing/2014/main" id="{29B01D7A-B059-F91C-B173-69E8DA9F76E9}"/>
-              </a:ext>
-            </a:extLst>
-          </p:cNvPr>
-          <p:cNvSpPr/>
-          <p:nvPr/>
-        </p:nvSpPr>
-        <p:spPr>
-          <a:xfrm>
-            <a:off x="3264064" y="6816777"/>
-            <a:ext cx="1396919" cy="196523"/>
-          </a:xfrm>
-          <a:prstGeom prst="rect">
-            <a:avLst/>
-          </a:prstGeom>
-          <a:solidFill>
-            <a:schemeClr val="bg1">
-              <a:lumMod val="95000"/>
-            </a:schemeClr>
-          </a:solidFill>
-          <a:ln w="3175" cap="flat" cmpd="sng" algn="ctr">
-            <a:noFill/>
-            <a:prstDash val="solid"/>
-            <a:miter lim="800000"/>
-          </a:ln>
-          <a:effectLst/>
-        </p:spPr>
-        <p:txBody>
-          <a:bodyPr lIns="0" tIns="0" rIns="0" bIns="0" rtlCol="0" anchor="ctr"/>
-          <a:lstStyle/>
-          <a:p>
-            <a:pPr marL="0" marR="0" lvl="0" indent="0" algn="ctr" defTabSz="914400" eaLnBrk="1" fontAlgn="auto" latinLnBrk="0" hangingPunct="1">
-              <a:spcBef>
-                <a:spcPts val="0"/>
-              </a:spcBef>
-              <a:spcAft>
-                <a:spcPts val="0"/>
-              </a:spcAft>
-              <a:buClrTx/>
-              <a:buSzTx/>
-              <a:buFontTx/>
-              <a:buNone/>
-              <a:tabLst/>
-              <a:defRPr/>
-            </a:pPr>
-            <a:r>
-              <a:rPr kumimoji="0" lang="en-US" altLang="ko-KR" sz="1000" i="0" u="none" strike="noStrike" kern="0" cap="none" spc="0" normalizeH="0" baseline="0" noProof="0" dirty="0">
-                <a:ln>
-                  <a:noFill/>
-                </a:ln>
-                <a:solidFill>
-                  <a:schemeClr val="tx1">
-                    <a:lumMod val="50000"/>
-                    <a:lumOff val="50000"/>
-                  </a:schemeClr>
-                </a:solidFill>
-                <a:effectLst/>
-                <a:uLnTx/>
-                <a:uFillTx/>
-                <a:latin typeface="Calibri" panose="020F0502020204030204" pitchFamily="34" charset="0"/>
-                <a:ea typeface="맑은 고딕"/>
-              </a:rPr>
-              <a:t>Env Vars</a:t>
-            </a:r>
-            <a:endParaRPr kumimoji="0" lang="ko-KR" altLang="en-US" sz="1000" i="0" u="none" strike="noStrike" kern="0" cap="none" spc="0" normalizeH="0" baseline="0" noProof="0" dirty="0">
-              <a:ln>
-                <a:noFill/>
-              </a:ln>
-              <a:solidFill>
-                <a:schemeClr val="tx1">
-                  <a:lumMod val="50000"/>
-                  <a:lumOff val="50000"/>
-                </a:schemeClr>
-              </a:solidFill>
-              <a:effectLst/>
-              <a:uLnTx/>
-              <a:uFillTx/>
-              <a:latin typeface="Calibri" panose="020F0502020204030204" pitchFamily="34" charset="0"/>
-              <a:ea typeface="맑은 고딕"/>
-            </a:endParaRPr>
-          </a:p>
-        </p:txBody>
-      </p:sp>
-      <p:sp>
-        <p:nvSpPr>
-          <p:cNvPr id="1064" name="직사각형 363">
-            <a:extLst>
-              <a:ext uri="{FF2B5EF4-FFF2-40B4-BE49-F238E27FC236}">
-                <a16:creationId xmlns:a16="http://schemas.microsoft.com/office/drawing/2014/main" id="{D5B13824-3F72-B6EF-9327-8D0DD5D478B5}"/>
-              </a:ext>
-            </a:extLst>
-          </p:cNvPr>
-          <p:cNvSpPr/>
-          <p:nvPr/>
-        </p:nvSpPr>
-        <p:spPr>
-          <a:xfrm>
-            <a:off x="4827696" y="6808084"/>
-            <a:ext cx="801381" cy="213336"/>
-          </a:xfrm>
-          <a:prstGeom prst="rect">
-            <a:avLst/>
-          </a:prstGeom>
-          <a:solidFill>
-            <a:schemeClr val="bg1">
-              <a:lumMod val="95000"/>
-            </a:schemeClr>
-          </a:solidFill>
-          <a:ln w="3175" cap="flat" cmpd="sng" algn="ctr">
-            <a:noFill/>
-            <a:prstDash val="solid"/>
-            <a:miter lim="800000"/>
-          </a:ln>
-          <a:effectLst/>
-        </p:spPr>
-        <p:txBody>
-          <a:bodyPr lIns="0" tIns="0" rIns="0" bIns="0" rtlCol="0" anchor="ctr"/>
-          <a:lstStyle/>
-          <a:p>
-            <a:pPr marL="0" marR="0" lvl="0" indent="0" algn="ctr" defTabSz="914400" eaLnBrk="1" fontAlgn="auto" latinLnBrk="0" hangingPunct="1">
-              <a:spcBef>
-                <a:spcPts val="0"/>
-              </a:spcBef>
-              <a:spcAft>
-                <a:spcPts val="0"/>
-              </a:spcAft>
-              <a:buClrTx/>
-              <a:buSzTx/>
-              <a:buFontTx/>
-              <a:buNone/>
-              <a:tabLst/>
-              <a:defRPr/>
-            </a:pPr>
-            <a:r>
-              <a:rPr kumimoji="0" lang="en-US" altLang="ko-KR" sz="1000" i="0" u="none" strike="noStrike" kern="0" cap="none" spc="0" normalizeH="0" baseline="0" noProof="0" dirty="0">
-                <a:ln>
-                  <a:noFill/>
-                </a:ln>
-                <a:solidFill>
-                  <a:schemeClr val="tx1">
-                    <a:lumMod val="50000"/>
-                    <a:lumOff val="50000"/>
-                  </a:schemeClr>
-                </a:solidFill>
-                <a:effectLst/>
-                <a:uLnTx/>
-                <a:uFillTx/>
-                <a:latin typeface="Calibri" panose="020F0502020204030204" pitchFamily="34" charset="0"/>
-                <a:ea typeface="맑은 고딕"/>
-              </a:rPr>
-              <a:t>Env Vars</a:t>
-            </a:r>
-            <a:endParaRPr kumimoji="0" lang="ko-KR" altLang="en-US" sz="1000" i="0" u="none" strike="noStrike" kern="0" cap="none" spc="0" normalizeH="0" baseline="0" noProof="0" dirty="0">
-              <a:ln>
-                <a:noFill/>
-              </a:ln>
-              <a:solidFill>
-                <a:schemeClr val="tx1">
-                  <a:lumMod val="50000"/>
-                  <a:lumOff val="50000"/>
-                </a:schemeClr>
-              </a:solidFill>
-              <a:effectLst/>
-              <a:uLnTx/>
-              <a:uFillTx/>
-              <a:latin typeface="Calibri" panose="020F0502020204030204" pitchFamily="34" charset="0"/>
-              <a:ea typeface="맑은 고딕"/>
-            </a:endParaRPr>
-          </a:p>
-        </p:txBody>
-      </p:sp>
       <p:cxnSp>
         <p:nvCxnSpPr>
           <p:cNvPr id="1072" name="Elbow Connector 1071">
@@ -6726,14 +6091,13 @@
           <p:nvPr/>
         </p:nvCxnSpPr>
         <p:spPr>
-          <a:xfrm rot="16200000" flipH="1">
-            <a:off x="4251524" y="2721590"/>
-            <a:ext cx="346490" cy="1304111"/>
+          <a:xfrm>
+            <a:off x="3772713" y="3200401"/>
+            <a:ext cx="1304113" cy="346490"/>
           </a:xfrm>
-          <a:prstGeom prst="bentConnector4">
+          <a:prstGeom prst="bentConnector3">
             <a:avLst>
-              <a:gd name="adj1" fmla="val 98964"/>
-              <a:gd name="adj2" fmla="val 61489"/>
+              <a:gd name="adj1" fmla="val 50000"/>
             </a:avLst>
           </a:prstGeom>
           <a:ln w="3175">
@@ -6823,7 +6187,7 @@
         </p:nvSpPr>
         <p:spPr>
           <a:xfrm>
-            <a:off x="7456210" y="2911232"/>
+            <a:off x="7447497" y="2911232"/>
             <a:ext cx="59958" cy="142083"/>
           </a:xfrm>
           <a:prstGeom prst="rect">
@@ -6896,7 +6260,7 @@
         </p:nvCxnSpPr>
         <p:spPr>
           <a:xfrm>
-            <a:off x="4554577" y="2696353"/>
+            <a:off x="4545864" y="2696353"/>
             <a:ext cx="2931612" cy="214879"/>
           </a:xfrm>
           <a:prstGeom prst="bentConnector2">
@@ -7291,6 +6655,84 @@
           </a:fontRef>
         </p:style>
       </p:cxnSp>
+      <p:sp>
+        <p:nvSpPr>
+          <p:cNvPr id="2" name="Can 1">
+            <a:extLst>
+              <a:ext uri="{FF2B5EF4-FFF2-40B4-BE49-F238E27FC236}">
+                <a16:creationId xmlns:a16="http://schemas.microsoft.com/office/drawing/2014/main" id="{D90D0B13-D3F4-BEFF-DB9D-EFF24A5CADE3}"/>
+              </a:ext>
+            </a:extLst>
+          </p:cNvPr>
+          <p:cNvSpPr/>
+          <p:nvPr/>
+        </p:nvSpPr>
+        <p:spPr>
+          <a:xfrm>
+            <a:off x="8937787" y="2912344"/>
+            <a:ext cx="680070" cy="814156"/>
+          </a:xfrm>
+          <a:prstGeom prst="can">
+            <a:avLst/>
+          </a:prstGeom>
+          <a:solidFill>
+            <a:schemeClr val="accent6">
+              <a:lumMod val="20000"/>
+              <a:lumOff val="80000"/>
+            </a:schemeClr>
+          </a:solidFill>
+          <a:ln w="3175">
+            <a:solidFill>
+              <a:schemeClr val="accent6">
+                <a:lumMod val="60000"/>
+                <a:lumOff val="40000"/>
+              </a:schemeClr>
+            </a:solidFill>
+          </a:ln>
+        </p:spPr>
+        <p:style>
+          <a:lnRef idx="2">
+            <a:schemeClr val="accent1">
+              <a:shade val="50000"/>
+            </a:schemeClr>
+          </a:lnRef>
+          <a:fillRef idx="1">
+            <a:schemeClr val="accent1"/>
+          </a:fillRef>
+          <a:effectRef idx="0">
+            <a:schemeClr val="accent1"/>
+          </a:effectRef>
+          <a:fontRef idx="minor">
+            <a:schemeClr val="lt1"/>
+          </a:fontRef>
+        </p:style>
+        <p:txBody>
+          <a:bodyPr rtlCol="0" anchor="ctr"/>
+          <a:lstStyle/>
+          <a:p>
+            <a:pPr algn="ctr"/>
+            <a:r>
+              <a:rPr lang="en-US" sz="1200" dirty="0">
+                <a:solidFill>
+                  <a:schemeClr val="tx1"/>
+                </a:solidFill>
+              </a:rPr>
+              <a:t>Key/Val</a:t>
+            </a:r>
+          </a:p>
+          <a:p>
+            <a:pPr algn="ctr"/>
+            <a:r>
+              <a:rPr lang="en-US" sz="1200" dirty="0">
+                <a:solidFill>
+                  <a:schemeClr val="tx1"/>
+                </a:solidFill>
+              </a:rPr>
+              <a:t>Cache</a:t>
+            </a:r>
+          </a:p>
+        </p:txBody>
+      </p:sp>
     </p:spTree>
     <p:extLst>
       <p:ext uri="{BB962C8B-B14F-4D97-AF65-F5344CB8AC3E}">

</xml_diff>